<commit_message>
Last version with corrected fonts
</commit_message>
<xml_diff>
--- a/apresentacao/champs.pptx
+++ b/apresentacao/champs.pptx
@@ -11284,7 +11284,7 @@
         </p:nvGraphicFramePr>
         <p:xfrm>
           <a:off x="598488" y="4400550"/>
-          <a:ext cx="11807825" cy="3098799"/>
+          <a:ext cx="11807825" cy="3174685"/>
         </p:xfrm>
         <a:graphic>
           <a:graphicData uri="http://schemas.openxmlformats.org/drawingml/2006/table">
@@ -11641,8 +11641,8 @@
         </p:nvSpPr>
         <p:spPr bwMode="auto">
           <a:xfrm>
-            <a:off x="5213748" y="3676650"/>
-            <a:ext cx="2577308" cy="1508105"/>
+            <a:off x="4270152" y="3868688"/>
+            <a:ext cx="4464496" cy="1015663"/>
           </a:xfrm>
           <a:prstGeom prst="rect">
             <a:avLst/>
@@ -11672,7 +11672,7 @@
           </a:extLst>
         </p:spPr>
         <p:txBody>
-          <a:bodyPr wrap="none" lIns="0" tIns="0" rIns="40639" bIns="0">
+          <a:bodyPr wrap="square" lIns="0" tIns="0" rIns="40639" bIns="0">
             <a:spAutoFit/>
           </a:bodyPr>
           <a:lstStyle/>
@@ -11687,20 +11687,20 @@
                 <a:cs typeface="Arial Bold" charset="0"/>
                 <a:sym typeface="Arial Bold" charset="0"/>
               </a:rPr>
-              <a:t>#video</a:t>
+              <a:t>#</a:t>
+            </a:r>
+            <a:r>
+              <a:rPr lang="en-US" sz="6600" dirty="0" smtClean="0">
+                <a:solidFill>
+                  <a:schemeClr val="bg1"/>
+                </a:solidFill>
+                <a:latin typeface="Museo Slab 300" charset="0"/>
+                <a:cs typeface="Arial Bold" charset="0"/>
+                <a:sym typeface="Arial Bold" charset="0"/>
+              </a:rPr>
+              <a:t>video</a:t>
             </a:r>
             <a:endParaRPr lang="en-US" sz="6600" dirty="0">
-              <a:solidFill>
-                <a:schemeClr val="bg1"/>
-              </a:solidFill>
-              <a:latin typeface="Museo Slab 700" charset="0"/>
-              <a:cs typeface="Arial Bold" charset="0"/>
-              <a:sym typeface="Arial Bold" charset="0"/>
-            </a:endParaRPr>
-          </a:p>
-          <a:p>
-            <a:pPr marL="39688" algn="ctr"/>
-            <a:endParaRPr lang="en-US" sz="3200" dirty="0">
               <a:solidFill>
                 <a:schemeClr val="bg1"/>
               </a:solidFill>
@@ -13594,7 +13594,7 @@
         </p:nvSpPr>
         <p:spPr>
           <a:xfrm>
-            <a:off x="5707063" y="5576888"/>
+            <a:off x="5926138" y="5576888"/>
             <a:ext cx="6624637" cy="769441"/>
           </a:xfrm>
           <a:prstGeom prst="rect">
@@ -13718,8 +13718,8 @@
         </p:nvSpPr>
         <p:spPr bwMode="auto">
           <a:xfrm>
-            <a:off x="1862479" y="3676650"/>
-            <a:ext cx="9279843" cy="2462213"/>
+            <a:off x="1029792" y="4084712"/>
+            <a:ext cx="11377263" cy="1231106"/>
           </a:xfrm>
           <a:prstGeom prst="rect">
             <a:avLst/>
@@ -13749,7 +13749,7 @@
           </a:extLst>
         </p:spPr>
         <p:txBody>
-          <a:bodyPr wrap="none" lIns="0" tIns="0" rIns="40639" bIns="0">
+          <a:bodyPr wrap="square" lIns="0" tIns="0" rIns="40639" bIns="0">
             <a:spAutoFit/>
           </a:bodyPr>
           <a:lstStyle/>
@@ -13767,7 +13767,7 @@
               <a:t>http://</a:t>
             </a:r>
             <a:r>
-              <a:rPr lang="en-US" sz="8000" dirty="0" smtClean="0">
+              <a:rPr lang="en-US" sz="8000" dirty="0" err="1" smtClean="0">
                 <a:solidFill>
                   <a:schemeClr val="bg1"/>
                 </a:solidFill>
@@ -13777,17 +13777,6 @@
               </a:rPr>
               <a:t>dataminas.info</a:t>
             </a:r>
-            <a:endParaRPr lang="en-US" sz="8000" dirty="0">
-              <a:solidFill>
-                <a:schemeClr val="bg1"/>
-              </a:solidFill>
-              <a:latin typeface="Museo Slab 700" charset="0"/>
-              <a:cs typeface="Arial Bold" charset="0"/>
-              <a:sym typeface="Arial Bold" charset="0"/>
-            </a:endParaRPr>
-          </a:p>
-          <a:p>
-            <a:pPr marL="39688" algn="ctr"/>
             <a:endParaRPr lang="en-US" sz="8000" dirty="0">
               <a:solidFill>
                 <a:schemeClr val="bg1"/>

</xml_diff>